<commit_message>
Added slides for frame transition.
</commit_message>
<xml_diff>
--- a/figs/pix.pptx
+++ b/figs/pix.pptx
@@ -2407,7 +2407,7 @@
         <p:spPr>
           <a:xfrm>
             <a:off x="457200" y="1203480"/>
-            <a:ext cx="8229240" cy="2982960"/>
+            <a:ext cx="8228880" cy="2982600"/>
           </a:xfrm>
           <a:prstGeom prst="rect">
             <a:avLst/>
@@ -2422,7 +2422,7 @@
               <a:buChar char=""/>
             </a:pPr>
             <a:r>
-              <a:rPr lang="en-US" sz="3200">
+              <a:rPr lang="en-US">
                 <a:latin typeface="Arial"/>
               </a:rPr>
               <a:t>Click to edit the outline text format</a:t>
@@ -2436,7 +2436,7 @@
               <a:buChar char=""/>
             </a:pPr>
             <a:r>
-              <a:rPr lang="en-US" sz="2800">
+              <a:rPr lang="en-US">
                 <a:latin typeface="Arial"/>
               </a:rPr>
               <a:t>Second Outline Level</a:t>
@@ -2450,7 +2450,7 @@
               <a:buChar char=""/>
             </a:pPr>
             <a:r>
-              <a:rPr lang="en-US" sz="2400">
+              <a:rPr lang="en-US">
                 <a:latin typeface="Arial"/>
               </a:rPr>
               <a:t>Third Outline Level</a:t>
@@ -2464,7 +2464,7 @@
               <a:buChar char=""/>
             </a:pPr>
             <a:r>
-              <a:rPr lang="en-US" sz="2000">
+              <a:rPr lang="en-US">
                 <a:latin typeface="Arial"/>
               </a:rPr>
               <a:t>Fourth Outline Level</a:t>
@@ -2478,7 +2478,7 @@
               <a:buChar char=""/>
             </a:pPr>
             <a:r>
-              <a:rPr lang="en-US" sz="2000">
+              <a:rPr lang="en-US">
                 <a:latin typeface="Arial"/>
               </a:rPr>
               <a:t>Fifth Outline Level</a:t>
@@ -2492,7 +2492,7 @@
               <a:buChar char=""/>
             </a:pPr>
             <a:r>
-              <a:rPr lang="en-US" sz="2000">
+              <a:rPr lang="en-US">
                 <a:latin typeface="Arial"/>
               </a:rPr>
               <a:t>Sixth Outline Level</a:t>
@@ -2506,7 +2506,7 @@
               <a:buChar char=""/>
             </a:pPr>
             <a:r>
-              <a:rPr lang="en-US" sz="2000">
+              <a:rPr lang="en-US">
                 <a:latin typeface="Arial"/>
               </a:rPr>
               <a:t>Seventh Outline Level</a:t>
@@ -2765,7 +2765,7 @@
         <p:spPr>
           <a:xfrm>
             <a:off x="969120" y="434520"/>
-            <a:ext cx="4608360" cy="3222720"/>
+            <a:ext cx="4608000" cy="3222360"/>
           </a:xfrm>
           <a:prstGeom prst="rect">
             <a:avLst/>
@@ -2790,7 +2790,7 @@
         <p:spPr>
           <a:xfrm>
             <a:off x="2834640" y="297000"/>
-            <a:ext cx="4579200" cy="2811600"/>
+            <a:ext cx="4578840" cy="2811240"/>
           </a:xfrm>
           <a:prstGeom prst="rect">
             <a:avLst/>
@@ -2808,7 +2808,7 @@
         </p:nvPicPr>
         <p:blipFill>
           <a:blip r:embed="rId3"/>
-          <a:srcRect l="0" t="0" r="-2595186" b="0"/>
+          <a:srcRect l="0" t="0" r="2907788" b="0"/>
           <a:stretch>
             <a:fillRect/>
           </a:stretch>
@@ -2816,7 +2816,7 @@
         <p:spPr>
           <a:xfrm>
             <a:off x="4804560" y="160200"/>
-            <a:ext cx="3501360" cy="2257200"/>
+            <a:ext cx="3501000" cy="2256840"/>
           </a:xfrm>
           <a:prstGeom prst="rect">
             <a:avLst/>
@@ -2841,7 +2841,7 @@
         <p:spPr>
           <a:xfrm>
             <a:off x="4626720" y="2743200"/>
-            <a:ext cx="3693960" cy="2027880"/>
+            <a:ext cx="3693600" cy="2027520"/>
           </a:xfrm>
           <a:prstGeom prst="rect">
             <a:avLst/>
@@ -2859,7 +2859,7 @@
         </p:nvPicPr>
         <p:blipFill>
           <a:blip r:embed="rId5"/>
-          <a:srcRect l="0" t="5464227" r="0" b="3642818"/>
+          <a:srcRect l="0" t="4913529" r="0" b="3275505"/>
           <a:stretch>
             <a:fillRect/>
           </a:stretch>
@@ -2867,7 +2867,7 @@
         <p:spPr>
           <a:xfrm>
             <a:off x="969120" y="2754360"/>
-            <a:ext cx="3657240" cy="1964160"/>
+            <a:ext cx="3656880" cy="1963800"/>
           </a:xfrm>
           <a:prstGeom prst="rect">
             <a:avLst/>
@@ -2885,7 +2885,7 @@
         </p:nvPicPr>
         <p:blipFill>
           <a:blip r:embed="rId6"/>
-          <a:srcRect l="17993" t="0" r="17993" b="0"/>
+          <a:srcRect l="17985" t="0" r="17985" b="0"/>
           <a:stretch>
             <a:fillRect/>
           </a:stretch>
@@ -2893,7 +2893,7 @@
         <p:spPr>
           <a:xfrm>
             <a:off x="2449440" y="3749040"/>
-            <a:ext cx="675720" cy="1005480"/>
+            <a:ext cx="675360" cy="1005120"/>
           </a:xfrm>
           <a:prstGeom prst="rect">
             <a:avLst/>
@@ -2961,7 +2961,7 @@
         <p:spPr>
           <a:xfrm>
             <a:off x="2724480" y="698760"/>
-            <a:ext cx="547560" cy="547560"/>
+            <a:ext cx="547200" cy="547200"/>
           </a:xfrm>
           <a:prstGeom prst="ellipse">
             <a:avLst/>
@@ -3002,7 +3002,7 @@
         <p:spPr>
           <a:xfrm>
             <a:off x="3314880" y="826200"/>
-            <a:ext cx="1935720" cy="273240"/>
+            <a:ext cx="1935360" cy="272880"/>
           </a:xfrm>
           <a:prstGeom prst="rect">
             <a:avLst/>
@@ -3109,7 +3109,7 @@
         <p:spPr>
           <a:xfrm>
             <a:off x="600840" y="1815120"/>
-            <a:ext cx="547560" cy="547560"/>
+            <a:ext cx="547200" cy="547200"/>
           </a:xfrm>
           <a:prstGeom prst="ellipse">
             <a:avLst/>
@@ -3150,7 +3150,7 @@
         <p:spPr>
           <a:xfrm>
             <a:off x="2653200" y="1815480"/>
-            <a:ext cx="547560" cy="547560"/>
+            <a:ext cx="547200" cy="547200"/>
           </a:xfrm>
           <a:prstGeom prst="ellipse">
             <a:avLst/>
@@ -3191,7 +3191,7 @@
         <p:spPr>
           <a:xfrm>
             <a:off x="5317200" y="1815480"/>
-            <a:ext cx="547560" cy="547560"/>
+            <a:ext cx="547200" cy="547200"/>
           </a:xfrm>
           <a:prstGeom prst="ellipse">
             <a:avLst/>
@@ -3232,7 +3232,7 @@
         <p:spPr>
           <a:xfrm>
             <a:off x="1190880" y="1966320"/>
-            <a:ext cx="1335240" cy="273240"/>
+            <a:ext cx="1334880" cy="272880"/>
           </a:xfrm>
           <a:prstGeom prst="rect">
             <a:avLst/>
@@ -3273,7 +3273,7 @@
         <p:spPr>
           <a:xfrm>
             <a:off x="3242880" y="1966320"/>
-            <a:ext cx="1935000" cy="273240"/>
+            <a:ext cx="1934640" cy="272880"/>
           </a:xfrm>
           <a:prstGeom prst="rect">
             <a:avLst/>
@@ -3314,7 +3314,7 @@
         <p:spPr>
           <a:xfrm>
             <a:off x="2652480" y="2637720"/>
-            <a:ext cx="547560" cy="547560"/>
+            <a:ext cx="547200" cy="547200"/>
           </a:xfrm>
           <a:prstGeom prst="ellipse">
             <a:avLst/>
@@ -3355,7 +3355,7 @@
         <p:spPr>
           <a:xfrm>
             <a:off x="3242880" y="2765160"/>
-            <a:ext cx="1461240" cy="273240"/>
+            <a:ext cx="1460880" cy="272880"/>
           </a:xfrm>
           <a:prstGeom prst="rect">
             <a:avLst/>
@@ -3396,7 +3396,7 @@
         <p:spPr>
           <a:xfrm>
             <a:off x="2652480" y="3460680"/>
-            <a:ext cx="547560" cy="547560"/>
+            <a:ext cx="547200" cy="547200"/>
           </a:xfrm>
           <a:prstGeom prst="ellipse">
             <a:avLst/>
@@ -3459,7 +3459,7 @@
         <p:spPr>
           <a:xfrm>
             <a:off x="3242880" y="3588120"/>
-            <a:ext cx="1461240" cy="273240"/>
+            <a:ext cx="1460880" cy="272880"/>
           </a:xfrm>
           <a:prstGeom prst="rect">
             <a:avLst/>
@@ -3522,7 +3522,7 @@
         <p:spPr>
           <a:xfrm>
             <a:off x="5906880" y="1966320"/>
-            <a:ext cx="2105640" cy="273240"/>
+            <a:ext cx="2105280" cy="272880"/>
           </a:xfrm>
           <a:prstGeom prst="rect">
             <a:avLst/>
@@ -3563,7 +3563,7 @@
         <p:spPr>
           <a:xfrm>
             <a:off x="5316840" y="2638080"/>
-            <a:ext cx="547560" cy="547560"/>
+            <a:ext cx="547200" cy="547200"/>
           </a:xfrm>
           <a:prstGeom prst="ellipse">
             <a:avLst/>
@@ -3626,7 +3626,7 @@
         <p:spPr>
           <a:xfrm>
             <a:off x="5893920" y="2373840"/>
-            <a:ext cx="3082680" cy="273240"/>
+            <a:ext cx="3082320" cy="272880"/>
           </a:xfrm>
           <a:prstGeom prst="rect">
             <a:avLst/>
@@ -3688,7 +3688,7 @@
         <p:spPr>
           <a:xfrm>
             <a:off x="2030400" y="1515600"/>
-            <a:ext cx="343080" cy="106920"/>
+            <a:ext cx="342720" cy="106560"/>
           </a:xfrm>
           <a:prstGeom prst="rect">
             <a:avLst/>
@@ -3727,7 +3727,7 @@
         <p:spPr>
           <a:xfrm>
             <a:off x="3009600" y="1501920"/>
-            <a:ext cx="349560" cy="120600"/>
+            <a:ext cx="349200" cy="120240"/>
           </a:xfrm>
           <a:prstGeom prst="rect">
             <a:avLst/>
@@ -3766,7 +3766,7 @@
         <p:spPr>
           <a:xfrm>
             <a:off x="3740400" y="1521360"/>
-            <a:ext cx="374760" cy="65160"/>
+            <a:ext cx="374400" cy="64800"/>
           </a:xfrm>
           <a:prstGeom prst="rect">
             <a:avLst/>
@@ -3805,7 +3805,7 @@
         <p:spPr>
           <a:xfrm>
             <a:off x="5893920" y="2661840"/>
-            <a:ext cx="3082680" cy="286920"/>
+            <a:ext cx="3082320" cy="286560"/>
           </a:xfrm>
           <a:prstGeom prst="rect">
             <a:avLst/>
@@ -3846,7 +3846,7 @@
         <p:spPr>
           <a:xfrm>
             <a:off x="5893920" y="2949840"/>
-            <a:ext cx="3082680" cy="273240"/>
+            <a:ext cx="3082320" cy="272880"/>
           </a:xfrm>
           <a:prstGeom prst="rect">
             <a:avLst/>
@@ -3887,7 +3887,7 @@
         <p:spPr>
           <a:xfrm>
             <a:off x="5893920" y="3237840"/>
-            <a:ext cx="3082680" cy="273240"/>
+            <a:ext cx="3082320" cy="272880"/>
           </a:xfrm>
           <a:prstGeom prst="rect">
             <a:avLst/>
@@ -3991,7 +3991,7 @@
         <p:spPr>
           <a:xfrm>
             <a:off x="601560" y="2643840"/>
-            <a:ext cx="547560" cy="547560"/>
+            <a:ext cx="547200" cy="547200"/>
           </a:xfrm>
           <a:prstGeom prst="ellipse">
             <a:avLst/>
@@ -4054,7 +4054,7 @@
         <p:spPr>
           <a:xfrm>
             <a:off x="1190880" y="2794320"/>
-            <a:ext cx="1346040" cy="273240"/>
+            <a:ext cx="1345680" cy="272880"/>
           </a:xfrm>
           <a:prstGeom prst="rect">
             <a:avLst/>
@@ -4143,14 +4143,15 @@
         </p:nvPicPr>
         <p:blipFill>
           <a:blip r:embed="rId1"/>
+          <a:srcRect l="2249" t="0" r="2249" b="0"/>
           <a:stretch>
             <a:fillRect/>
           </a:stretch>
         </p:blipFill>
         <p:spPr>
           <a:xfrm>
-            <a:off x="346320" y="1576800"/>
-            <a:ext cx="3416040" cy="1918800"/>
+            <a:off x="5012640" y="1576800"/>
+            <a:ext cx="3721320" cy="1918440"/>
           </a:xfrm>
           <a:prstGeom prst="rect">
             <a:avLst/>
@@ -4174,8 +4175,8 @@
         </p:blipFill>
         <p:spPr>
           <a:xfrm>
-            <a:off x="4923360" y="1576800"/>
-            <a:ext cx="3900240" cy="1918800"/>
+            <a:off x="3943440" y="1920240"/>
+            <a:ext cx="1014120" cy="1555560"/>
           </a:xfrm>
           <a:prstGeom prst="rect">
             <a:avLst/>
@@ -4185,22 +4186,161 @@
           </a:ln>
         </p:spPr>
       </p:pic>
+      <p:sp>
+        <p:nvSpPr>
+          <p:cNvPr id="80" name="CustomShape 1"/>
+          <p:cNvSpPr/>
+          <p:nvPr/>
+        </p:nvSpPr>
+        <p:spPr>
+          <a:xfrm>
+            <a:off x="430200" y="3444480"/>
+            <a:ext cx="3580920" cy="435960"/>
+          </a:xfrm>
+          <a:prstGeom prst="rect">
+            <a:avLst/>
+          </a:prstGeom>
+          <a:noFill/>
+          <a:ln>
+            <a:noFill/>
+          </a:ln>
+        </p:spPr>
+        <p:txBody>
+          <a:bodyPr lIns="90000" rIns="90000" tIns="45000" bIns="45000"/>
+          <a:p>
+            <a:r>
+              <a:rPr lang="en-US" sz="1400">
+                <a:latin typeface="Arial"/>
+              </a:rPr>
+              <a:t>&lt;mvan, 7m, gray, big, honda, med, med&gt;</a:t>
+            </a:r>
+            <a:endParaRPr/>
+          </a:p>
+        </p:txBody>
+      </p:sp>
+      <p:sp>
+        <p:nvSpPr>
+          <p:cNvPr id="81" name="CustomShape 2"/>
+          <p:cNvSpPr/>
+          <p:nvPr/>
+        </p:nvSpPr>
+        <p:spPr>
+          <a:xfrm>
+            <a:off x="5317200" y="3444480"/>
+            <a:ext cx="3516840" cy="435960"/>
+          </a:xfrm>
+          <a:prstGeom prst="rect">
+            <a:avLst/>
+          </a:prstGeom>
+          <a:noFill/>
+          <a:ln>
+            <a:noFill/>
+          </a:ln>
+        </p:spPr>
+        <p:txBody>
+          <a:bodyPr lIns="90000" rIns="90000" tIns="45000" bIns="45000"/>
+          <a:p>
+            <a:r>
+              <a:rPr lang="en-US" sz="1400">
+                <a:latin typeface="Arial"/>
+              </a:rPr>
+              <a:t>&lt;sedan, 5, blue, med, vw, med, med&gt;</a:t>
+            </a:r>
+            <a:endParaRPr/>
+          </a:p>
+        </p:txBody>
+      </p:sp>
+      <p:sp>
+        <p:nvSpPr>
+          <p:cNvPr id="82" name="CustomShape 3"/>
+          <p:cNvSpPr/>
+          <p:nvPr/>
+        </p:nvSpPr>
+        <p:spPr>
+          <a:xfrm>
+            <a:off x="274320" y="1280160"/>
+            <a:ext cx="3580920" cy="435960"/>
+          </a:xfrm>
+          <a:prstGeom prst="rect">
+            <a:avLst/>
+          </a:prstGeom>
+          <a:noFill/>
+          <a:ln>
+            <a:noFill/>
+          </a:ln>
+        </p:spPr>
+        <p:txBody>
+          <a:bodyPr lIns="90000" rIns="90000" tIns="45000" bIns="45000"/>
+          <a:p>
+            <a:pPr algn="ctr">
+              <a:lnSpc>
+                <a:spcPct val="100000"/>
+              </a:lnSpc>
+            </a:pPr>
+            <a:r>
+              <a:rPr lang="en-US" sz="1400">
+                <a:latin typeface="Arial"/>
+              </a:rPr>
+              <a:t>Car1</a:t>
+            </a:r>
+            <a:endParaRPr/>
+          </a:p>
+        </p:txBody>
+      </p:sp>
+      <p:sp>
+        <p:nvSpPr>
+          <p:cNvPr id="83" name="CustomShape 4"/>
+          <p:cNvSpPr/>
+          <p:nvPr/>
+        </p:nvSpPr>
+        <p:spPr>
+          <a:xfrm>
+            <a:off x="5097240" y="1295640"/>
+            <a:ext cx="3580920" cy="435960"/>
+          </a:xfrm>
+          <a:prstGeom prst="rect">
+            <a:avLst/>
+          </a:prstGeom>
+          <a:noFill/>
+          <a:ln>
+            <a:noFill/>
+          </a:ln>
+        </p:spPr>
+        <p:txBody>
+          <a:bodyPr lIns="90000" rIns="90000" tIns="45000" bIns="45000"/>
+          <a:p>
+            <a:pPr algn="ctr">
+              <a:lnSpc>
+                <a:spcPct val="100000"/>
+              </a:lnSpc>
+            </a:pPr>
+            <a:r>
+              <a:rPr lang="en-US" sz="1400">
+                <a:latin typeface="Arial"/>
+              </a:rPr>
+              <a:t>Car2</a:t>
+            </a:r>
+            <a:endParaRPr/>
+          </a:p>
+        </p:txBody>
+      </p:sp>
       <p:pic>
         <p:nvPicPr>
-          <p:cNvPr id="80" name="" descr=""/>
+          <p:cNvPr id="84" name="" descr=""/>
           <p:cNvPicPr/>
           <p:nvPr/>
         </p:nvPicPr>
         <p:blipFill>
           <a:blip r:embed="rId3"/>
+          <a:srcRect l="0" t="330729" r="0" b="165364"/>
           <a:stretch>
             <a:fillRect/>
           </a:stretch>
         </p:blipFill>
         <p:spPr>
           <a:xfrm>
-            <a:off x="3799440" y="1920240"/>
-            <a:ext cx="1014480" cy="1555920"/>
+            <a:off x="365760" y="1576800"/>
+            <a:ext cx="3585600" cy="1897920"/>
           </a:xfrm>
           <a:prstGeom prst="rect">
             <a:avLst/>
@@ -4210,144 +4350,6 @@
           </a:ln>
         </p:spPr>
       </p:pic>
-      <p:sp>
-        <p:nvSpPr>
-          <p:cNvPr id="81" name="CustomShape 1"/>
-          <p:cNvSpPr/>
-          <p:nvPr/>
-        </p:nvSpPr>
-        <p:spPr>
-          <a:xfrm>
-            <a:off x="322200" y="3444480"/>
-            <a:ext cx="3581280" cy="436320"/>
-          </a:xfrm>
-          <a:prstGeom prst="rect">
-            <a:avLst/>
-          </a:prstGeom>
-          <a:noFill/>
-          <a:ln>
-            <a:noFill/>
-          </a:ln>
-        </p:spPr>
-        <p:txBody>
-          <a:bodyPr lIns="90000" rIns="90000" tIns="45000" bIns="45000"/>
-          <a:p>
-            <a:r>
-              <a:rPr lang="en-US" sz="1400">
-                <a:latin typeface="Arial"/>
-              </a:rPr>
-              <a:t>&lt;mvan, 6m, grey, big, honda, med, med&gt;</a:t>
-            </a:r>
-            <a:endParaRPr/>
-          </a:p>
-        </p:txBody>
-      </p:sp>
-      <p:sp>
-        <p:nvSpPr>
-          <p:cNvPr id="82" name="CustomShape 2"/>
-          <p:cNvSpPr/>
-          <p:nvPr/>
-        </p:nvSpPr>
-        <p:spPr>
-          <a:xfrm>
-            <a:off x="5353200" y="3444480"/>
-            <a:ext cx="3517200" cy="436320"/>
-          </a:xfrm>
-          <a:prstGeom prst="rect">
-            <a:avLst/>
-          </a:prstGeom>
-          <a:noFill/>
-          <a:ln>
-            <a:noFill/>
-          </a:ln>
-        </p:spPr>
-        <p:txBody>
-          <a:bodyPr lIns="90000" rIns="90000" tIns="45000" bIns="45000"/>
-          <a:p>
-            <a:r>
-              <a:rPr lang="en-US" sz="1400">
-                <a:latin typeface="Arial"/>
-              </a:rPr>
-              <a:t>&lt;sedan, 4, blue, med, vw, med, med&gt;</a:t>
-            </a:r>
-            <a:endParaRPr/>
-          </a:p>
-        </p:txBody>
-      </p:sp>
-      <p:sp>
-        <p:nvSpPr>
-          <p:cNvPr id="83" name="CustomShape 3"/>
-          <p:cNvSpPr/>
-          <p:nvPr/>
-        </p:nvSpPr>
-        <p:spPr>
-          <a:xfrm>
-            <a:off x="274320" y="1280160"/>
-            <a:ext cx="3581280" cy="436320"/>
-          </a:xfrm>
-          <a:prstGeom prst="rect">
-            <a:avLst/>
-          </a:prstGeom>
-          <a:noFill/>
-          <a:ln>
-            <a:noFill/>
-          </a:ln>
-        </p:spPr>
-        <p:txBody>
-          <a:bodyPr lIns="90000" rIns="90000" tIns="45000" bIns="45000"/>
-          <a:p>
-            <a:pPr algn="ctr">
-              <a:lnSpc>
-                <a:spcPct val="100000"/>
-              </a:lnSpc>
-            </a:pPr>
-            <a:r>
-              <a:rPr lang="en-US" sz="1400">
-                <a:latin typeface="Arial"/>
-              </a:rPr>
-              <a:t>Car1</a:t>
-            </a:r>
-            <a:endParaRPr/>
-          </a:p>
-        </p:txBody>
-      </p:sp>
-      <p:sp>
-        <p:nvSpPr>
-          <p:cNvPr id="84" name="CustomShape 4"/>
-          <p:cNvSpPr/>
-          <p:nvPr/>
-        </p:nvSpPr>
-        <p:spPr>
-          <a:xfrm>
-            <a:off x="5097240" y="1295640"/>
-            <a:ext cx="3581280" cy="436320"/>
-          </a:xfrm>
-          <a:prstGeom prst="rect">
-            <a:avLst/>
-          </a:prstGeom>
-          <a:noFill/>
-          <a:ln>
-            <a:noFill/>
-          </a:ln>
-        </p:spPr>
-        <p:txBody>
-          <a:bodyPr lIns="90000" rIns="90000" tIns="45000" bIns="45000"/>
-          <a:p>
-            <a:pPr algn="ctr">
-              <a:lnSpc>
-                <a:spcPct val="100000"/>
-              </a:lnSpc>
-            </a:pPr>
-            <a:r>
-              <a:rPr lang="en-US" sz="1400">
-                <a:latin typeface="Arial"/>
-              </a:rPr>
-              <a:t>Car2</a:t>
-            </a:r>
-            <a:endParaRPr/>
-          </a:p>
-        </p:txBody>
-      </p:sp>
     </p:spTree>
   </p:cSld>
   <p:timing>
@@ -4405,14 +4407,15 @@
         </p:nvPicPr>
         <p:blipFill>
           <a:blip r:embed="rId1"/>
+          <a:srcRect l="2249" t="0" r="2249" b="0"/>
           <a:stretch>
             <a:fillRect/>
           </a:stretch>
         </p:blipFill>
         <p:spPr>
           <a:xfrm>
-            <a:off x="346320" y="1576800"/>
-            <a:ext cx="3416040" cy="1918800"/>
+            <a:off x="5012640" y="1576800"/>
+            <a:ext cx="3721320" cy="1918440"/>
           </a:xfrm>
           <a:prstGeom prst="rect">
             <a:avLst/>
@@ -4436,8 +4439,8 @@
         </p:blipFill>
         <p:spPr>
           <a:xfrm>
-            <a:off x="4923360" y="1576800"/>
-            <a:ext cx="3900240" cy="1918800"/>
+            <a:off x="3943440" y="1920240"/>
+            <a:ext cx="1014120" cy="1555560"/>
           </a:xfrm>
           <a:prstGeom prst="rect">
             <a:avLst/>
@@ -4447,22 +4450,97 @@
           </a:ln>
         </p:spPr>
       </p:pic>
+      <p:sp>
+        <p:nvSpPr>
+          <p:cNvPr id="87" name="CustomShape 1"/>
+          <p:cNvSpPr/>
+          <p:nvPr/>
+        </p:nvSpPr>
+        <p:spPr>
+          <a:xfrm>
+            <a:off x="274320" y="1280160"/>
+            <a:ext cx="3580920" cy="435960"/>
+          </a:xfrm>
+          <a:prstGeom prst="rect">
+            <a:avLst/>
+          </a:prstGeom>
+          <a:noFill/>
+          <a:ln>
+            <a:noFill/>
+          </a:ln>
+        </p:spPr>
+        <p:txBody>
+          <a:bodyPr lIns="90000" rIns="90000" tIns="45000" bIns="45000"/>
+          <a:p>
+            <a:pPr algn="ctr">
+              <a:lnSpc>
+                <a:spcPct val="100000"/>
+              </a:lnSpc>
+            </a:pPr>
+            <a:r>
+              <a:rPr lang="en-US" sz="1400">
+                <a:latin typeface="Arial"/>
+              </a:rPr>
+              <a:t>Car1</a:t>
+            </a:r>
+            <a:endParaRPr/>
+          </a:p>
+        </p:txBody>
+      </p:sp>
+      <p:sp>
+        <p:nvSpPr>
+          <p:cNvPr id="88" name="CustomShape 2"/>
+          <p:cNvSpPr/>
+          <p:nvPr/>
+        </p:nvSpPr>
+        <p:spPr>
+          <a:xfrm>
+            <a:off x="5097240" y="1295640"/>
+            <a:ext cx="3580920" cy="435960"/>
+          </a:xfrm>
+          <a:prstGeom prst="rect">
+            <a:avLst/>
+          </a:prstGeom>
+          <a:noFill/>
+          <a:ln>
+            <a:noFill/>
+          </a:ln>
+        </p:spPr>
+        <p:txBody>
+          <a:bodyPr lIns="90000" rIns="90000" tIns="45000" bIns="45000"/>
+          <a:p>
+            <a:pPr algn="ctr">
+              <a:lnSpc>
+                <a:spcPct val="100000"/>
+              </a:lnSpc>
+            </a:pPr>
+            <a:r>
+              <a:rPr lang="en-US" sz="1400">
+                <a:latin typeface="Arial"/>
+              </a:rPr>
+              <a:t>Car2</a:t>
+            </a:r>
+            <a:endParaRPr/>
+          </a:p>
+        </p:txBody>
+      </p:sp>
       <p:pic>
         <p:nvPicPr>
-          <p:cNvPr id="87" name="" descr=""/>
+          <p:cNvPr id="89" name="" descr=""/>
           <p:cNvPicPr/>
           <p:nvPr/>
         </p:nvPicPr>
         <p:blipFill>
           <a:blip r:embed="rId3"/>
+          <a:srcRect l="0" t="330729" r="0" b="165364"/>
           <a:stretch>
             <a:fillRect/>
           </a:stretch>
         </p:blipFill>
         <p:spPr>
           <a:xfrm>
-            <a:off x="3799440" y="1920240"/>
-            <a:ext cx="1014480" cy="1555920"/>
+            <a:off x="365760" y="1576800"/>
+            <a:ext cx="3585600" cy="1897920"/>
           </a:xfrm>
           <a:prstGeom prst="rect">
             <a:avLst/>
@@ -4472,80 +4550,6 @@
           </a:ln>
         </p:spPr>
       </p:pic>
-      <p:sp>
-        <p:nvSpPr>
-          <p:cNvPr id="88" name="CustomShape 1"/>
-          <p:cNvSpPr/>
-          <p:nvPr/>
-        </p:nvSpPr>
-        <p:spPr>
-          <a:xfrm>
-            <a:off x="274320" y="1280160"/>
-            <a:ext cx="3581280" cy="436320"/>
-          </a:xfrm>
-          <a:prstGeom prst="rect">
-            <a:avLst/>
-          </a:prstGeom>
-          <a:noFill/>
-          <a:ln>
-            <a:noFill/>
-          </a:ln>
-        </p:spPr>
-        <p:txBody>
-          <a:bodyPr lIns="90000" rIns="90000" tIns="45000" bIns="45000"/>
-          <a:p>
-            <a:pPr algn="ctr">
-              <a:lnSpc>
-                <a:spcPct val="100000"/>
-              </a:lnSpc>
-            </a:pPr>
-            <a:r>
-              <a:rPr lang="en-US" sz="1400">
-                <a:latin typeface="Arial"/>
-              </a:rPr>
-              <a:t>Car1</a:t>
-            </a:r>
-            <a:endParaRPr/>
-          </a:p>
-        </p:txBody>
-      </p:sp>
-      <p:sp>
-        <p:nvSpPr>
-          <p:cNvPr id="89" name="CustomShape 2"/>
-          <p:cNvSpPr/>
-          <p:nvPr/>
-        </p:nvSpPr>
-        <p:spPr>
-          <a:xfrm>
-            <a:off x="5097240" y="1295640"/>
-            <a:ext cx="3581280" cy="436320"/>
-          </a:xfrm>
-          <a:prstGeom prst="rect">
-            <a:avLst/>
-          </a:prstGeom>
-          <a:noFill/>
-          <a:ln>
-            <a:noFill/>
-          </a:ln>
-        </p:spPr>
-        <p:txBody>
-          <a:bodyPr lIns="90000" rIns="90000" tIns="45000" bIns="45000"/>
-          <a:p>
-            <a:pPr algn="ctr">
-              <a:lnSpc>
-                <a:spcPct val="100000"/>
-              </a:lnSpc>
-            </a:pPr>
-            <a:r>
-              <a:rPr lang="en-US" sz="1400">
-                <a:latin typeface="Arial"/>
-              </a:rPr>
-              <a:t>Car2</a:t>
-            </a:r>
-            <a:endParaRPr/>
-          </a:p>
-        </p:txBody>
-      </p:sp>
     </p:spTree>
   </p:cSld>
   <p:timing>
@@ -4610,7 +4614,7 @@
         <p:spPr>
           <a:xfrm>
             <a:off x="3566160" y="1903680"/>
-            <a:ext cx="1551960" cy="1557720"/>
+            <a:ext cx="1551600" cy="1557360"/>
           </a:xfrm>
           <a:prstGeom prst="rect">
             <a:avLst/>
@@ -4635,7 +4639,7 @@
         <p:spPr>
           <a:xfrm>
             <a:off x="346320" y="1576800"/>
-            <a:ext cx="3416040" cy="1918800"/>
+            <a:ext cx="3415680" cy="1918440"/>
           </a:xfrm>
           <a:prstGeom prst="rect">
             <a:avLst/>
@@ -4660,7 +4664,7 @@
         <p:spPr>
           <a:xfrm>
             <a:off x="4923360" y="1576800"/>
-            <a:ext cx="3900240" cy="1918800"/>
+            <a:ext cx="3899880" cy="1918440"/>
           </a:xfrm>
           <a:prstGeom prst="rect">
             <a:avLst/>
@@ -4679,7 +4683,7 @@
         <p:spPr>
           <a:xfrm>
             <a:off x="322200" y="3444480"/>
-            <a:ext cx="3581280" cy="436320"/>
+            <a:ext cx="3580920" cy="435960"/>
           </a:xfrm>
           <a:prstGeom prst="rect">
             <a:avLst/>
@@ -4711,7 +4715,7 @@
         <p:spPr>
           <a:xfrm>
             <a:off x="5353200" y="3444480"/>
-            <a:ext cx="3517200" cy="436320"/>
+            <a:ext cx="3516840" cy="435960"/>
           </a:xfrm>
           <a:prstGeom prst="rect">
             <a:avLst/>
@@ -4743,7 +4747,7 @@
         <p:spPr>
           <a:xfrm>
             <a:off x="274320" y="1280160"/>
-            <a:ext cx="3581280" cy="436320"/>
+            <a:ext cx="3580920" cy="435960"/>
           </a:xfrm>
           <a:prstGeom prst="rect">
             <a:avLst/>
@@ -4780,7 +4784,7 @@
         <p:spPr>
           <a:xfrm>
             <a:off x="5097240" y="1295640"/>
-            <a:ext cx="3581280" cy="436320"/>
+            <a:ext cx="3580920" cy="435960"/>
           </a:xfrm>
           <a:prstGeom prst="rect">
             <a:avLst/>
@@ -4872,7 +4876,7 @@
         <p:spPr>
           <a:xfrm>
             <a:off x="2651760" y="1097280"/>
-            <a:ext cx="3931200" cy="3931200"/>
+            <a:ext cx="3930840" cy="3930840"/>
           </a:xfrm>
           <a:prstGeom prst="rect">
             <a:avLst/>
@@ -4890,7 +4894,7 @@
         </p:nvPicPr>
         <p:blipFill>
           <a:blip r:embed="rId2"/>
-          <a:srcRect l="16135" t="4597" r="16135" b="4597"/>
+          <a:srcRect l="16126" t="4587" r="16126" b="4587"/>
           <a:stretch>
             <a:fillRect/>
           </a:stretch>
@@ -4898,7 +4902,7 @@
         <p:spPr>
           <a:xfrm>
             <a:off x="4059360" y="2286000"/>
-            <a:ext cx="1168560" cy="1617480"/>
+            <a:ext cx="1168200" cy="1617120"/>
           </a:xfrm>
           <a:prstGeom prst="rect">
             <a:avLst/>
@@ -4966,7 +4970,7 @@
         <p:spPr>
           <a:xfrm>
             <a:off x="2760480" y="667440"/>
-            <a:ext cx="547560" cy="547560"/>
+            <a:ext cx="547200" cy="547200"/>
           </a:xfrm>
           <a:prstGeom prst="ellipse">
             <a:avLst/>
@@ -5007,7 +5011,7 @@
         <p:spPr>
           <a:xfrm>
             <a:off x="3458880" y="778320"/>
-            <a:ext cx="2757960" cy="273240"/>
+            <a:ext cx="2757600" cy="272880"/>
           </a:xfrm>
           <a:prstGeom prst="rect">
             <a:avLst/>
@@ -5048,7 +5052,7 @@
         <p:spPr>
           <a:xfrm>
             <a:off x="2760480" y="1490400"/>
-            <a:ext cx="547560" cy="547560"/>
+            <a:ext cx="547200" cy="547200"/>
           </a:xfrm>
           <a:prstGeom prst="ellipse">
             <a:avLst/>
@@ -5089,7 +5093,7 @@
         <p:spPr>
           <a:xfrm>
             <a:off x="3458880" y="1617840"/>
-            <a:ext cx="2757960" cy="273240"/>
+            <a:ext cx="2757600" cy="272880"/>
           </a:xfrm>
           <a:prstGeom prst="rect">
             <a:avLst/>
@@ -5152,7 +5156,7 @@
         <p:spPr>
           <a:xfrm>
             <a:off x="2760480" y="2313360"/>
-            <a:ext cx="547560" cy="547560"/>
+            <a:ext cx="547200" cy="547200"/>
           </a:xfrm>
           <a:prstGeom prst="ellipse">
             <a:avLst/>
@@ -5215,7 +5219,7 @@
         <p:spPr>
           <a:xfrm>
             <a:off x="3458880" y="2404800"/>
-            <a:ext cx="2757960" cy="273240"/>
+            <a:ext cx="2757600" cy="272880"/>
           </a:xfrm>
           <a:prstGeom prst="rect">
             <a:avLst/>
@@ -5256,7 +5260,7 @@
         <p:spPr>
           <a:xfrm>
             <a:off x="2760480" y="3136320"/>
-            <a:ext cx="547560" cy="547560"/>
+            <a:ext cx="547200" cy="547200"/>
           </a:xfrm>
           <a:prstGeom prst="ellipse">
             <a:avLst/>
@@ -5319,7 +5323,7 @@
         <p:spPr>
           <a:xfrm>
             <a:off x="3458880" y="3263760"/>
-            <a:ext cx="2757960" cy="273240"/>
+            <a:ext cx="2757600" cy="272880"/>
           </a:xfrm>
           <a:prstGeom prst="rect">
             <a:avLst/>
@@ -5409,7 +5413,7 @@
         <p:spPr>
           <a:xfrm>
             <a:off x="2760480" y="667440"/>
-            <a:ext cx="547560" cy="547560"/>
+            <a:ext cx="547200" cy="547200"/>
           </a:xfrm>
           <a:prstGeom prst="ellipse">
             <a:avLst/>
@@ -5450,7 +5454,7 @@
         <p:spPr>
           <a:xfrm>
             <a:off x="3458880" y="778320"/>
-            <a:ext cx="3580920" cy="273240"/>
+            <a:ext cx="3580560" cy="272880"/>
           </a:xfrm>
           <a:prstGeom prst="rect">
             <a:avLst/>
@@ -5491,7 +5495,7 @@
         <p:spPr>
           <a:xfrm>
             <a:off x="2760480" y="1900800"/>
-            <a:ext cx="547560" cy="547560"/>
+            <a:ext cx="547200" cy="547200"/>
           </a:xfrm>
           <a:prstGeom prst="ellipse">
             <a:avLst/>
@@ -5532,7 +5536,7 @@
         <p:spPr>
           <a:xfrm>
             <a:off x="3458880" y="1617840"/>
-            <a:ext cx="4861080" cy="273240"/>
+            <a:ext cx="4860720" cy="272880"/>
           </a:xfrm>
           <a:prstGeom prst="rect">
             <a:avLst/>
@@ -5595,7 +5599,7 @@
         <p:spPr>
           <a:xfrm>
             <a:off x="2760480" y="3177360"/>
-            <a:ext cx="547560" cy="547560"/>
+            <a:ext cx="547200" cy="547200"/>
           </a:xfrm>
           <a:prstGeom prst="ellipse">
             <a:avLst/>
@@ -5658,7 +5662,7 @@
         <p:spPr>
           <a:xfrm>
             <a:off x="3458880" y="3268800"/>
-            <a:ext cx="3580920" cy="273240"/>
+            <a:ext cx="3580560" cy="272880"/>
           </a:xfrm>
           <a:prstGeom prst="rect">
             <a:avLst/>
@@ -5720,7 +5724,7 @@
         <p:spPr>
           <a:xfrm>
             <a:off x="3458880" y="1905840"/>
-            <a:ext cx="4861080" cy="273240"/>
+            <a:ext cx="4860720" cy="272880"/>
           </a:xfrm>
           <a:prstGeom prst="rect">
             <a:avLst/>
@@ -5782,7 +5786,7 @@
         <p:spPr>
           <a:xfrm>
             <a:off x="3458880" y="2193840"/>
-            <a:ext cx="4861080" cy="273240"/>
+            <a:ext cx="4860720" cy="272880"/>
           </a:xfrm>
           <a:prstGeom prst="rect">
             <a:avLst/>
@@ -5844,7 +5848,7 @@
         <p:spPr>
           <a:xfrm>
             <a:off x="3458880" y="2481840"/>
-            <a:ext cx="4861080" cy="273240"/>
+            <a:ext cx="4860720" cy="272880"/>
           </a:xfrm>
           <a:prstGeom prst="rect">
             <a:avLst/>
@@ -5955,7 +5959,7 @@
         <p:spPr>
           <a:xfrm>
             <a:off x="3228120" y="698760"/>
-            <a:ext cx="547560" cy="547560"/>
+            <a:ext cx="547200" cy="547200"/>
           </a:xfrm>
           <a:prstGeom prst="ellipse">
             <a:avLst/>
@@ -5996,7 +6000,7 @@
         <p:spPr>
           <a:xfrm>
             <a:off x="3818880" y="826200"/>
-            <a:ext cx="1113120" cy="273240"/>
+            <a:ext cx="1112760" cy="272880"/>
           </a:xfrm>
           <a:prstGeom prst="rect">
             <a:avLst/>
@@ -6059,7 +6063,7 @@
         <p:spPr>
           <a:xfrm>
             <a:off x="2282400" y="1486440"/>
-            <a:ext cx="343080" cy="106920"/>
+            <a:ext cx="342720" cy="106560"/>
           </a:xfrm>
           <a:prstGeom prst="rect">
             <a:avLst/>
@@ -6098,7 +6102,7 @@
         <p:spPr>
           <a:xfrm>
             <a:off x="3544560" y="1493280"/>
-            <a:ext cx="196920" cy="106920"/>
+            <a:ext cx="196560" cy="106560"/>
           </a:xfrm>
           <a:prstGeom prst="rect">
             <a:avLst/>
@@ -6137,7 +6141,7 @@
         <p:spPr>
           <a:xfrm>
             <a:off x="4406760" y="1493280"/>
-            <a:ext cx="173160" cy="106920"/>
+            <a:ext cx="172800" cy="106560"/>
           </a:xfrm>
           <a:prstGeom prst="rect">
             <a:avLst/>
@@ -6176,7 +6180,7 @@
         <p:spPr>
           <a:xfrm>
             <a:off x="600120" y="1768320"/>
-            <a:ext cx="547560" cy="547560"/>
+            <a:ext cx="547200" cy="547200"/>
           </a:xfrm>
           <a:prstGeom prst="ellipse">
             <a:avLst/>
@@ -6261,7 +6265,7 @@
         <p:spPr>
           <a:xfrm>
             <a:off x="3227760" y="1768320"/>
-            <a:ext cx="547560" cy="547560"/>
+            <a:ext cx="547200" cy="547200"/>
           </a:xfrm>
           <a:prstGeom prst="ellipse">
             <a:avLst/>
@@ -6302,7 +6306,7 @@
         <p:spPr>
           <a:xfrm>
             <a:off x="5819760" y="1768320"/>
-            <a:ext cx="547560" cy="547560"/>
+            <a:ext cx="547200" cy="547200"/>
           </a:xfrm>
           <a:prstGeom prst="ellipse">
             <a:avLst/>
@@ -6343,7 +6347,7 @@
         <p:spPr>
           <a:xfrm>
             <a:off x="600120" y="2611440"/>
-            <a:ext cx="547560" cy="547560"/>
+            <a:ext cx="547200" cy="547200"/>
           </a:xfrm>
           <a:prstGeom prst="ellipse">
             <a:avLst/>
@@ -6384,7 +6388,7 @@
         <p:spPr>
           <a:xfrm>
             <a:off x="600120" y="3470400"/>
-            <a:ext cx="547560" cy="547560"/>
+            <a:ext cx="547200" cy="547200"/>
           </a:xfrm>
           <a:prstGeom prst="ellipse">
             <a:avLst/>
@@ -6469,7 +6473,7 @@
         <p:spPr>
           <a:xfrm>
             <a:off x="3227760" y="2632320"/>
-            <a:ext cx="547560" cy="547560"/>
+            <a:ext cx="547200" cy="547200"/>
           </a:xfrm>
           <a:prstGeom prst="ellipse">
             <a:avLst/>
@@ -6532,7 +6536,7 @@
         <p:spPr>
           <a:xfrm>
             <a:off x="1190880" y="1896120"/>
-            <a:ext cx="1461240" cy="273240"/>
+            <a:ext cx="1460880" cy="272880"/>
           </a:xfrm>
           <a:prstGeom prst="rect">
             <a:avLst/>
@@ -6573,7 +6577,7 @@
         <p:spPr>
           <a:xfrm>
             <a:off x="3818880" y="2760120"/>
-            <a:ext cx="1461240" cy="273240"/>
+            <a:ext cx="1460880" cy="272880"/>
           </a:xfrm>
           <a:prstGeom prst="rect">
             <a:avLst/>
@@ -6614,7 +6618,7 @@
         <p:spPr>
           <a:xfrm>
             <a:off x="1190880" y="2758320"/>
-            <a:ext cx="1335240" cy="273240"/>
+            <a:ext cx="1334880" cy="272880"/>
           </a:xfrm>
           <a:prstGeom prst="rect">
             <a:avLst/>
@@ -6655,7 +6659,7 @@
         <p:spPr>
           <a:xfrm>
             <a:off x="3818880" y="1894320"/>
-            <a:ext cx="1335240" cy="273240"/>
+            <a:ext cx="1334880" cy="272880"/>
           </a:xfrm>
           <a:prstGeom prst="rect">
             <a:avLst/>
@@ -6696,7 +6700,7 @@
         <p:spPr>
           <a:xfrm>
             <a:off x="1190880" y="3634200"/>
-            <a:ext cx="1935720" cy="273240"/>
+            <a:ext cx="1935360" cy="272880"/>
           </a:xfrm>
           <a:prstGeom prst="rect">
             <a:avLst/>
@@ -6737,7 +6741,7 @@
         <p:spPr>
           <a:xfrm>
             <a:off x="6410880" y="1906200"/>
-            <a:ext cx="1935720" cy="273240"/>
+            <a:ext cx="1935360" cy="272880"/>
           </a:xfrm>
           <a:prstGeom prst="rect">
             <a:avLst/>
@@ -6827,7 +6831,7 @@
         <p:spPr>
           <a:xfrm>
             <a:off x="3696480" y="698760"/>
-            <a:ext cx="547560" cy="547560"/>
+            <a:ext cx="547200" cy="547200"/>
           </a:xfrm>
           <a:prstGeom prst="ellipse">
             <a:avLst/>
@@ -6868,7 +6872,7 @@
         <p:spPr>
           <a:xfrm>
             <a:off x="4286880" y="826200"/>
-            <a:ext cx="1935720" cy="273240"/>
+            <a:ext cx="1935360" cy="272880"/>
           </a:xfrm>
           <a:prstGeom prst="rect">
             <a:avLst/>
@@ -6997,7 +7001,7 @@
         <p:spPr>
           <a:xfrm>
             <a:off x="132840" y="1815120"/>
-            <a:ext cx="547560" cy="547560"/>
+            <a:ext cx="547200" cy="547200"/>
           </a:xfrm>
           <a:prstGeom prst="ellipse">
             <a:avLst/>
@@ -7038,7 +7042,7 @@
         <p:spPr>
           <a:xfrm>
             <a:off x="2185200" y="1815480"/>
-            <a:ext cx="547560" cy="547560"/>
+            <a:ext cx="547200" cy="547200"/>
           </a:xfrm>
           <a:prstGeom prst="ellipse">
             <a:avLst/>
@@ -7079,7 +7083,7 @@
         <p:spPr>
           <a:xfrm>
             <a:off x="4849200" y="1815480"/>
-            <a:ext cx="547560" cy="547560"/>
+            <a:ext cx="547200" cy="547200"/>
           </a:xfrm>
           <a:prstGeom prst="ellipse">
             <a:avLst/>
@@ -7120,7 +7124,7 @@
         <p:spPr>
           <a:xfrm>
             <a:off x="722880" y="1966320"/>
-            <a:ext cx="1335240" cy="273240"/>
+            <a:ext cx="1334880" cy="272880"/>
           </a:xfrm>
           <a:prstGeom prst="rect">
             <a:avLst/>
@@ -7161,7 +7165,7 @@
         <p:spPr>
           <a:xfrm>
             <a:off x="2774880" y="1966320"/>
-            <a:ext cx="1935000" cy="273240"/>
+            <a:ext cx="1934640" cy="272880"/>
           </a:xfrm>
           <a:prstGeom prst="rect">
             <a:avLst/>
@@ -7202,7 +7206,7 @@
         <p:spPr>
           <a:xfrm>
             <a:off x="2184480" y="2637720"/>
-            <a:ext cx="547560" cy="547560"/>
+            <a:ext cx="547200" cy="547200"/>
           </a:xfrm>
           <a:prstGeom prst="ellipse">
             <a:avLst/>
@@ -7243,7 +7247,7 @@
         <p:spPr>
           <a:xfrm>
             <a:off x="2774880" y="2765160"/>
-            <a:ext cx="1461240" cy="273240"/>
+            <a:ext cx="1460880" cy="272880"/>
           </a:xfrm>
           <a:prstGeom prst="rect">
             <a:avLst/>
@@ -7284,7 +7288,7 @@
         <p:spPr>
           <a:xfrm>
             <a:off x="2184480" y="3460680"/>
-            <a:ext cx="547560" cy="547560"/>
+            <a:ext cx="547200" cy="547200"/>
           </a:xfrm>
           <a:prstGeom prst="ellipse">
             <a:avLst/>
@@ -7347,7 +7351,7 @@
         <p:spPr>
           <a:xfrm>
             <a:off x="2774880" y="3588120"/>
-            <a:ext cx="1461240" cy="273240"/>
+            <a:ext cx="1460880" cy="272880"/>
           </a:xfrm>
           <a:prstGeom prst="rect">
             <a:avLst/>
@@ -7410,7 +7414,7 @@
         <p:spPr>
           <a:xfrm>
             <a:off x="5438880" y="1966320"/>
-            <a:ext cx="2105640" cy="273240"/>
+            <a:ext cx="2105280" cy="272880"/>
           </a:xfrm>
           <a:prstGeom prst="rect">
             <a:avLst/>
@@ -7451,7 +7455,7 @@
         <p:spPr>
           <a:xfrm>
             <a:off x="4848840" y="2638080"/>
-            <a:ext cx="547560" cy="547560"/>
+            <a:ext cx="547200" cy="547200"/>
           </a:xfrm>
           <a:prstGeom prst="ellipse">
             <a:avLst/>
@@ -7514,7 +7518,7 @@
         <p:spPr>
           <a:xfrm>
             <a:off x="5425920" y="2373840"/>
-            <a:ext cx="3082680" cy="273240"/>
+            <a:ext cx="3082320" cy="272880"/>
           </a:xfrm>
           <a:prstGeom prst="rect">
             <a:avLst/>
@@ -7576,7 +7580,7 @@
         <p:spPr>
           <a:xfrm>
             <a:off x="2390400" y="1515600"/>
-            <a:ext cx="343080" cy="106920"/>
+            <a:ext cx="342720" cy="106560"/>
           </a:xfrm>
           <a:prstGeom prst="rect">
             <a:avLst/>
@@ -7615,7 +7619,7 @@
         <p:spPr>
           <a:xfrm>
             <a:off x="3333600" y="1501920"/>
-            <a:ext cx="349560" cy="120600"/>
+            <a:ext cx="349200" cy="120240"/>
           </a:xfrm>
           <a:prstGeom prst="rect">
             <a:avLst/>
@@ -7654,7 +7658,7 @@
         <p:spPr>
           <a:xfrm>
             <a:off x="4064400" y="1521360"/>
-            <a:ext cx="374760" cy="65160"/>
+            <a:ext cx="374400" cy="64800"/>
           </a:xfrm>
           <a:prstGeom prst="rect">
             <a:avLst/>
@@ -7693,7 +7697,7 @@
         <p:spPr>
           <a:xfrm>
             <a:off x="5396400" y="1535760"/>
-            <a:ext cx="374760" cy="65160"/>
+            <a:ext cx="374400" cy="64800"/>
           </a:xfrm>
           <a:prstGeom prst="rect">
             <a:avLst/>
@@ -7732,7 +7736,7 @@
         <p:spPr>
           <a:xfrm>
             <a:off x="5425920" y="2661840"/>
-            <a:ext cx="3082680" cy="286920"/>
+            <a:ext cx="3082320" cy="286560"/>
           </a:xfrm>
           <a:prstGeom prst="rect">
             <a:avLst/>
@@ -7773,7 +7777,7 @@
         <p:spPr>
           <a:xfrm>
             <a:off x="5425920" y="2949840"/>
-            <a:ext cx="3082680" cy="273240"/>
+            <a:ext cx="3082320" cy="272880"/>
           </a:xfrm>
           <a:prstGeom prst="rect">
             <a:avLst/>
@@ -7814,7 +7818,7 @@
         <p:spPr>
           <a:xfrm>
             <a:off x="5425920" y="3237840"/>
-            <a:ext cx="3082680" cy="273240"/>
+            <a:ext cx="3082320" cy="272880"/>
           </a:xfrm>
           <a:prstGeom prst="rect">
             <a:avLst/>
@@ -7918,7 +7922,7 @@
         <p:spPr>
           <a:xfrm>
             <a:off x="133560" y="2643840"/>
-            <a:ext cx="547560" cy="547560"/>
+            <a:ext cx="547200" cy="547200"/>
           </a:xfrm>
           <a:prstGeom prst="ellipse">
             <a:avLst/>
@@ -7981,7 +7985,7 @@
         <p:spPr>
           <a:xfrm>
             <a:off x="722880" y="2794320"/>
-            <a:ext cx="1346040" cy="273240"/>
+            <a:ext cx="1345680" cy="272880"/>
           </a:xfrm>
           <a:prstGeom prst="rect">
             <a:avLst/>

</xml_diff>